<commit_message>
adding use cases as requested
</commit_message>
<xml_diff>
--- a/NEW YORK CITY TAXI TRIP ANALYSIS.pptx
+++ b/NEW YORK CITY TAXI TRIP ANALYSIS.pptx
@@ -13,7 +13,8 @@
     <p:sldId id="260" r:id="rId7"/>
     <p:sldId id="261" r:id="rId8"/>
     <p:sldId id="262" r:id="rId9"/>
-    <p:sldId id="264" r:id="rId10"/>
+    <p:sldId id="265" r:id="rId10"/>
+    <p:sldId id="264" r:id="rId11"/>
   </p:sldIdLst>
   <p:sldSz cx="12192000" cy="6858000"/>
   <p:notesSz cx="6858000" cy="9144000"/>
@@ -114,7 +115,7 @@
   </p:defaultTextStyle>
   <p:extLst>
     <p:ext uri="{EFAFB233-063F-42B5-8137-9DF3F51BA10A}">
-      <p15:sldGuideLst xmlns:p15="http://schemas.microsoft.com/office/powerpoint/2012/main"/>
+      <p15:sldGuideLst xmlns:p15="http://schemas.microsoft.com/office/powerpoint/2012/main" xmlns=""/>
     </p:ext>
   </p:extLst>
 </p:presentation>
@@ -170,7 +171,7 @@
           <a:noFill/>
           <a:extLst>
             <a:ext uri="{909E8E84-426E-40dd-AFC4-6F175D3DCCD1}">
-              <a14:hiddenFill xmlns="" xmlns:a14="http://schemas.microsoft.com/office/drawing/2010/main">
+              <a14:hiddenFill xmlns:a14="http://schemas.microsoft.com/office/drawing/2010/main">
                 <a:solidFill>
                   <a:srgbClr val="FFFFFF"/>
                 </a:solidFill>
@@ -230,7 +231,7 @@
             </a:ln>
             <a:extLst>
               <a:ext uri="{91240B29-F687-4f45-9708-019B960494DF}">
-                <a14:hiddenLine xmlns="" xmlns:a14="http://schemas.microsoft.com/office/drawing/2010/main" w="9525">
+                <a14:hiddenLine xmlns:a14="http://schemas.microsoft.com/office/drawing/2010/main" w="9525">
                   <a:solidFill>
                     <a:srgbClr val="000000"/>
                   </a:solidFill>
@@ -320,7 +321,7 @@
             </a:ln>
             <a:extLst>
               <a:ext uri="{91240B29-F687-4f45-9708-019B960494DF}">
-                <a14:hiddenLine xmlns="" xmlns:a14="http://schemas.microsoft.com/office/drawing/2010/main" w="9525">
+                <a14:hiddenLine xmlns:a14="http://schemas.microsoft.com/office/drawing/2010/main" w="9525">
                   <a:solidFill>
                     <a:srgbClr val="000000"/>
                   </a:solidFill>
@@ -410,7 +411,7 @@
             </a:ln>
             <a:extLst>
               <a:ext uri="{91240B29-F687-4f45-9708-019B960494DF}">
-                <a14:hiddenLine xmlns="" xmlns:a14="http://schemas.microsoft.com/office/drawing/2010/main" w="9525">
+                <a14:hiddenLine xmlns:a14="http://schemas.microsoft.com/office/drawing/2010/main" w="9525">
                   <a:solidFill>
                     <a:srgbClr val="000000"/>
                   </a:solidFill>
@@ -444,7 +445,7 @@
             </a:ln>
             <a:extLst>
               <a:ext uri="{91240B29-F687-4f45-9708-019B960494DF}">
-                <a14:hiddenLine xmlns="" xmlns:a14="http://schemas.microsoft.com/office/drawing/2010/main" w="9525">
+                <a14:hiddenLine xmlns:a14="http://schemas.microsoft.com/office/drawing/2010/main" w="9525">
                   <a:solidFill>
                     <a:srgbClr val="000000"/>
                   </a:solidFill>
@@ -534,7 +535,7 @@
             </a:ln>
             <a:extLst>
               <a:ext uri="{91240B29-F687-4f45-9708-019B960494DF}">
-                <a14:hiddenLine xmlns="" xmlns:a14="http://schemas.microsoft.com/office/drawing/2010/main" w="9525">
+                <a14:hiddenLine xmlns:a14="http://schemas.microsoft.com/office/drawing/2010/main" w="9525">
                   <a:solidFill>
                     <a:srgbClr val="000000"/>
                   </a:solidFill>
@@ -596,7 +597,7 @@
             </a:ln>
             <a:extLst>
               <a:ext uri="{91240B29-F687-4f45-9708-019B960494DF}">
-                <a14:hiddenLine xmlns="" xmlns:a14="http://schemas.microsoft.com/office/drawing/2010/main" w="9525">
+                <a14:hiddenLine xmlns:a14="http://schemas.microsoft.com/office/drawing/2010/main" w="9525">
                   <a:solidFill>
                     <a:srgbClr val="000000"/>
                   </a:solidFill>
@@ -658,7 +659,7 @@
             </a:ln>
             <a:extLst>
               <a:ext uri="{91240B29-F687-4f45-9708-019B960494DF}">
-                <a14:hiddenLine xmlns="" xmlns:a14="http://schemas.microsoft.com/office/drawing/2010/main" w="9525">
+                <a14:hiddenLine xmlns:a14="http://schemas.microsoft.com/office/drawing/2010/main" w="9525">
                   <a:solidFill>
                     <a:srgbClr val="000000"/>
                   </a:solidFill>
@@ -748,7 +749,7 @@
             </a:ln>
             <a:extLst>
               <a:ext uri="{91240B29-F687-4f45-9708-019B960494DF}">
-                <a14:hiddenLine xmlns="" xmlns:a14="http://schemas.microsoft.com/office/drawing/2010/main" w="9525">
+                <a14:hiddenLine xmlns:a14="http://schemas.microsoft.com/office/drawing/2010/main" w="9525">
                   <a:solidFill>
                     <a:srgbClr val="000000"/>
                   </a:solidFill>
@@ -810,7 +811,7 @@
             </a:ln>
             <a:extLst>
               <a:ext uri="{91240B29-F687-4f45-9708-019B960494DF}">
-                <a14:hiddenLine xmlns="" xmlns:a14="http://schemas.microsoft.com/office/drawing/2010/main" w="9525">
+                <a14:hiddenLine xmlns:a14="http://schemas.microsoft.com/office/drawing/2010/main" w="9525">
                   <a:solidFill>
                     <a:srgbClr val="000000"/>
                   </a:solidFill>
@@ -872,7 +873,7 @@
             </a:ln>
             <a:extLst>
               <a:ext uri="{91240B29-F687-4f45-9708-019B960494DF}">
-                <a14:hiddenLine xmlns="" xmlns:a14="http://schemas.microsoft.com/office/drawing/2010/main" w="9525">
+                <a14:hiddenLine xmlns:a14="http://schemas.microsoft.com/office/drawing/2010/main" w="9525">
                   <a:solidFill>
                     <a:srgbClr val="000000"/>
                   </a:solidFill>
@@ -962,7 +963,7 @@
             </a:ln>
             <a:extLst>
               <a:ext uri="{91240B29-F687-4f45-9708-019B960494DF}">
-                <a14:hiddenLine xmlns="" xmlns:a14="http://schemas.microsoft.com/office/drawing/2010/main" w="9525">
+                <a14:hiddenLine xmlns:a14="http://schemas.microsoft.com/office/drawing/2010/main" w="9525">
                   <a:solidFill>
                     <a:srgbClr val="000000"/>
                   </a:solidFill>
@@ -1052,7 +1053,7 @@
             </a:ln>
             <a:extLst>
               <a:ext uri="{91240B29-F687-4f45-9708-019B960494DF}">
-                <a14:hiddenLine xmlns="" xmlns:a14="http://schemas.microsoft.com/office/drawing/2010/main" w="9525">
+                <a14:hiddenLine xmlns:a14="http://schemas.microsoft.com/office/drawing/2010/main" w="9525">
                   <a:solidFill>
                     <a:srgbClr val="000000"/>
                   </a:solidFill>
@@ -1114,7 +1115,7 @@
             </a:ln>
             <a:extLst>
               <a:ext uri="{91240B29-F687-4f45-9708-019B960494DF}">
-                <a14:hiddenLine xmlns="" xmlns:a14="http://schemas.microsoft.com/office/drawing/2010/main" w="9525">
+                <a14:hiddenLine xmlns:a14="http://schemas.microsoft.com/office/drawing/2010/main" w="9525">
                   <a:solidFill>
                     <a:srgbClr val="000000"/>
                   </a:solidFill>
@@ -1224,7 +1225,7 @@
             </a:ln>
             <a:extLst>
               <a:ext uri="{91240B29-F687-4f45-9708-019B960494DF}">
-                <a14:hiddenLine xmlns="" xmlns:a14="http://schemas.microsoft.com/office/drawing/2010/main" w="9525">
+                <a14:hiddenLine xmlns:a14="http://schemas.microsoft.com/office/drawing/2010/main" w="9525">
                   <a:solidFill>
                     <a:srgbClr val="000000"/>
                   </a:solidFill>
@@ -1286,7 +1287,7 @@
             </a:ln>
             <a:extLst>
               <a:ext uri="{91240B29-F687-4f45-9708-019B960494DF}">
-                <a14:hiddenLine xmlns="" xmlns:a14="http://schemas.microsoft.com/office/drawing/2010/main" w="9525">
+                <a14:hiddenLine xmlns:a14="http://schemas.microsoft.com/office/drawing/2010/main" w="9525">
                   <a:solidFill>
                     <a:srgbClr val="000000"/>
                   </a:solidFill>
@@ -1376,7 +1377,7 @@
             </a:ln>
             <a:extLst>
               <a:ext uri="{91240B29-F687-4f45-9708-019B960494DF}">
-                <a14:hiddenLine xmlns="" xmlns:a14="http://schemas.microsoft.com/office/drawing/2010/main" w="9525">
+                <a14:hiddenLine xmlns:a14="http://schemas.microsoft.com/office/drawing/2010/main" w="9525">
                   <a:solidFill>
                     <a:srgbClr val="000000"/>
                   </a:solidFill>
@@ -1466,7 +1467,7 @@
             </a:ln>
             <a:extLst>
               <a:ext uri="{91240B29-F687-4f45-9708-019B960494DF}">
-                <a14:hiddenLine xmlns="" xmlns:a14="http://schemas.microsoft.com/office/drawing/2010/main" w="9525">
+                <a14:hiddenLine xmlns:a14="http://schemas.microsoft.com/office/drawing/2010/main" w="9525">
                   <a:solidFill>
                     <a:srgbClr val="000000"/>
                   </a:solidFill>
@@ -1528,7 +1529,7 @@
             </a:ln>
             <a:extLst>
               <a:ext uri="{91240B29-F687-4f45-9708-019B960494DF}">
-                <a14:hiddenLine xmlns="" xmlns:a14="http://schemas.microsoft.com/office/drawing/2010/main" w="9525">
+                <a14:hiddenLine xmlns:a14="http://schemas.microsoft.com/office/drawing/2010/main" w="9525">
                   <a:solidFill>
                     <a:srgbClr val="000000"/>
                   </a:solidFill>
@@ -1618,7 +1619,7 @@
             </a:ln>
             <a:extLst>
               <a:ext uri="{91240B29-F687-4f45-9708-019B960494DF}">
-                <a14:hiddenLine xmlns="" xmlns:a14="http://schemas.microsoft.com/office/drawing/2010/main" w="9525">
+                <a14:hiddenLine xmlns:a14="http://schemas.microsoft.com/office/drawing/2010/main" w="9525">
                   <a:solidFill>
                     <a:srgbClr val="000000"/>
                   </a:solidFill>
@@ -1708,7 +1709,7 @@
             </a:ln>
             <a:extLst>
               <a:ext uri="{91240B29-F687-4f45-9708-019B960494DF}">
-                <a14:hiddenLine xmlns="" xmlns:a14="http://schemas.microsoft.com/office/drawing/2010/main" w="9525">
+                <a14:hiddenLine xmlns:a14="http://schemas.microsoft.com/office/drawing/2010/main" w="9525">
                   <a:solidFill>
                     <a:srgbClr val="000000"/>
                   </a:solidFill>
@@ -1764,7 +1765,7 @@
             </a:ln>
             <a:extLst>
               <a:ext uri="{91240B29-F687-4f45-9708-019B960494DF}">
-                <a14:hiddenLine xmlns="" xmlns:a14="http://schemas.microsoft.com/office/drawing/2010/main" w="9525">
+                <a14:hiddenLine xmlns:a14="http://schemas.microsoft.com/office/drawing/2010/main" w="9525">
                   <a:solidFill>
                     <a:srgbClr val="000000"/>
                   </a:solidFill>
@@ -1854,7 +1855,7 @@
             </a:ln>
             <a:extLst>
               <a:ext uri="{91240B29-F687-4f45-9708-019B960494DF}">
-                <a14:hiddenLine xmlns="" xmlns:a14="http://schemas.microsoft.com/office/drawing/2010/main" w="9525">
+                <a14:hiddenLine xmlns:a14="http://schemas.microsoft.com/office/drawing/2010/main" w="9525">
                   <a:solidFill>
                     <a:srgbClr val="000000"/>
                   </a:solidFill>
@@ -1910,7 +1911,7 @@
             </a:ln>
             <a:extLst>
               <a:ext uri="{91240B29-F687-4f45-9708-019B960494DF}">
-                <a14:hiddenLine xmlns="" xmlns:a14="http://schemas.microsoft.com/office/drawing/2010/main" w="9525">
+                <a14:hiddenLine xmlns:a14="http://schemas.microsoft.com/office/drawing/2010/main" w="9525">
                   <a:solidFill>
                     <a:srgbClr val="000000"/>
                   </a:solidFill>
@@ -2000,7 +2001,7 @@
             </a:ln>
             <a:extLst>
               <a:ext uri="{91240B29-F687-4f45-9708-019B960494DF}">
-                <a14:hiddenLine xmlns="" xmlns:a14="http://schemas.microsoft.com/office/drawing/2010/main" w="9525">
+                <a14:hiddenLine xmlns:a14="http://schemas.microsoft.com/office/drawing/2010/main" w="9525">
                   <a:solidFill>
                     <a:srgbClr val="000000"/>
                   </a:solidFill>
@@ -2068,7 +2069,7 @@
             </a:ln>
             <a:extLst>
               <a:ext uri="{91240B29-F687-4f45-9708-019B960494DF}">
-                <a14:hiddenLine xmlns="" xmlns:a14="http://schemas.microsoft.com/office/drawing/2010/main" w="9525">
+                <a14:hiddenLine xmlns:a14="http://schemas.microsoft.com/office/drawing/2010/main" w="9525">
                   <a:solidFill>
                     <a:srgbClr val="000000"/>
                   </a:solidFill>
@@ -2158,7 +2159,7 @@
             </a:ln>
             <a:extLst>
               <a:ext uri="{91240B29-F687-4f45-9708-019B960494DF}">
-                <a14:hiddenLine xmlns="" xmlns:a14="http://schemas.microsoft.com/office/drawing/2010/main" w="9525">
+                <a14:hiddenLine xmlns:a14="http://schemas.microsoft.com/office/drawing/2010/main" w="9525">
                   <a:solidFill>
                     <a:srgbClr val="000000"/>
                   </a:solidFill>
@@ -2226,7 +2227,7 @@
             </a:ln>
             <a:extLst>
               <a:ext uri="{91240B29-F687-4f45-9708-019B960494DF}">
-                <a14:hiddenLine xmlns="" xmlns:a14="http://schemas.microsoft.com/office/drawing/2010/main" w="9525">
+                <a14:hiddenLine xmlns:a14="http://schemas.microsoft.com/office/drawing/2010/main" w="9525">
                   <a:solidFill>
                     <a:srgbClr val="000000"/>
                   </a:solidFill>
@@ -2316,7 +2317,7 @@
             </a:ln>
             <a:extLst>
               <a:ext uri="{91240B29-F687-4f45-9708-019B960494DF}">
-                <a14:hiddenLine xmlns="" xmlns:a14="http://schemas.microsoft.com/office/drawing/2010/main" w="9525">
+                <a14:hiddenLine xmlns:a14="http://schemas.microsoft.com/office/drawing/2010/main" w="9525">
                   <a:solidFill>
                     <a:srgbClr val="000000"/>
                   </a:solidFill>
@@ -2350,7 +2351,7 @@
             </a:ln>
             <a:extLst>
               <a:ext uri="{91240B29-F687-4f45-9708-019B960494DF}">
-                <a14:hiddenLine xmlns="" xmlns:a14="http://schemas.microsoft.com/office/drawing/2010/main" w="9525">
+                <a14:hiddenLine xmlns:a14="http://schemas.microsoft.com/office/drawing/2010/main" w="9525">
                   <a:solidFill>
                     <a:srgbClr val="000000"/>
                   </a:solidFill>
@@ -2440,7 +2441,7 @@
             </a:ln>
             <a:extLst>
               <a:ext uri="{91240B29-F687-4f45-9708-019B960494DF}">
-                <a14:hiddenLine xmlns="" xmlns:a14="http://schemas.microsoft.com/office/drawing/2010/main" w="9525">
+                <a14:hiddenLine xmlns:a14="http://schemas.microsoft.com/office/drawing/2010/main" w="9525">
                   <a:solidFill>
                     <a:srgbClr val="000000"/>
                   </a:solidFill>
@@ -2502,7 +2503,7 @@
             </a:ln>
             <a:extLst>
               <a:ext uri="{91240B29-F687-4f45-9708-019B960494DF}">
-                <a14:hiddenLine xmlns="" xmlns:a14="http://schemas.microsoft.com/office/drawing/2010/main" w="9525">
+                <a14:hiddenLine xmlns:a14="http://schemas.microsoft.com/office/drawing/2010/main" w="9525">
                   <a:solidFill>
                     <a:srgbClr val="000000"/>
                   </a:solidFill>
@@ -2564,7 +2565,7 @@
             </a:ln>
             <a:extLst>
               <a:ext uri="{91240B29-F687-4f45-9708-019B960494DF}">
-                <a14:hiddenLine xmlns="" xmlns:a14="http://schemas.microsoft.com/office/drawing/2010/main" w="9525">
+                <a14:hiddenLine xmlns:a14="http://schemas.microsoft.com/office/drawing/2010/main" w="9525">
                   <a:solidFill>
                     <a:srgbClr val="000000"/>
                   </a:solidFill>
@@ -2654,7 +2655,7 @@
             </a:ln>
             <a:extLst>
               <a:ext uri="{91240B29-F687-4f45-9708-019B960494DF}">
-                <a14:hiddenLine xmlns="" xmlns:a14="http://schemas.microsoft.com/office/drawing/2010/main" w="9525">
+                <a14:hiddenLine xmlns:a14="http://schemas.microsoft.com/office/drawing/2010/main" w="9525">
                   <a:solidFill>
                     <a:srgbClr val="000000"/>
                   </a:solidFill>
@@ -2722,7 +2723,7 @@
             </a:ln>
             <a:extLst>
               <a:ext uri="{91240B29-F687-4f45-9708-019B960494DF}">
-                <a14:hiddenLine xmlns="" xmlns:a14="http://schemas.microsoft.com/office/drawing/2010/main" w="9525">
+                <a14:hiddenLine xmlns:a14="http://schemas.microsoft.com/office/drawing/2010/main" w="9525">
                   <a:solidFill>
                     <a:srgbClr val="000000"/>
                   </a:solidFill>
@@ -2784,7 +2785,7 @@
             </a:ln>
             <a:extLst>
               <a:ext uri="{91240B29-F687-4f45-9708-019B960494DF}">
-                <a14:hiddenLine xmlns="" xmlns:a14="http://schemas.microsoft.com/office/drawing/2010/main" w="9525">
+                <a14:hiddenLine xmlns:a14="http://schemas.microsoft.com/office/drawing/2010/main" w="9525">
                   <a:solidFill>
                     <a:srgbClr val="000000"/>
                   </a:solidFill>
@@ -2874,7 +2875,7 @@
             </a:ln>
             <a:extLst>
               <a:ext uri="{91240B29-F687-4f45-9708-019B960494DF}">
-                <a14:hiddenLine xmlns="" xmlns:a14="http://schemas.microsoft.com/office/drawing/2010/main" w="9525">
+                <a14:hiddenLine xmlns:a14="http://schemas.microsoft.com/office/drawing/2010/main" w="9525">
                   <a:solidFill>
                     <a:srgbClr val="000000"/>
                   </a:solidFill>
@@ -2936,7 +2937,7 @@
             </a:ln>
             <a:extLst>
               <a:ext uri="{91240B29-F687-4f45-9708-019B960494DF}">
-                <a14:hiddenLine xmlns="" xmlns:a14="http://schemas.microsoft.com/office/drawing/2010/main" w="9525">
+                <a14:hiddenLine xmlns:a14="http://schemas.microsoft.com/office/drawing/2010/main" w="9525">
                   <a:solidFill>
                     <a:srgbClr val="000000"/>
                   </a:solidFill>
@@ -3026,7 +3027,7 @@
             </a:ln>
             <a:extLst>
               <a:ext uri="{91240B29-F687-4f45-9708-019B960494DF}">
-                <a14:hiddenLine xmlns="" xmlns:a14="http://schemas.microsoft.com/office/drawing/2010/main" w="9525">
+                <a14:hiddenLine xmlns:a14="http://schemas.microsoft.com/office/drawing/2010/main" w="9525">
                   <a:solidFill>
                     <a:srgbClr val="000000"/>
                   </a:solidFill>
@@ -3088,7 +3089,7 @@
             </a:ln>
             <a:extLst>
               <a:ext uri="{91240B29-F687-4f45-9708-019B960494DF}">
-                <a14:hiddenLine xmlns="" xmlns:a14="http://schemas.microsoft.com/office/drawing/2010/main" w="9525">
+                <a14:hiddenLine xmlns:a14="http://schemas.microsoft.com/office/drawing/2010/main" w="9525">
                   <a:solidFill>
                     <a:srgbClr val="000000"/>
                   </a:solidFill>
@@ -3178,7 +3179,7 @@
             </a:ln>
             <a:extLst>
               <a:ext uri="{91240B29-F687-4f45-9708-019B960494DF}">
-                <a14:hiddenLine xmlns="" xmlns:a14="http://schemas.microsoft.com/office/drawing/2010/main" w="9525">
+                <a14:hiddenLine xmlns:a14="http://schemas.microsoft.com/office/drawing/2010/main" w="9525">
                   <a:solidFill>
                     <a:srgbClr val="000000"/>
                   </a:solidFill>
@@ -3212,7 +3213,7 @@
             </a:ln>
             <a:extLst>
               <a:ext uri="{91240B29-F687-4f45-9708-019B960494DF}">
-                <a14:hiddenLine xmlns="" xmlns:a14="http://schemas.microsoft.com/office/drawing/2010/main" w="9525">
+                <a14:hiddenLine xmlns:a14="http://schemas.microsoft.com/office/drawing/2010/main" w="9525">
                   <a:solidFill>
                     <a:srgbClr val="000000"/>
                   </a:solidFill>
@@ -3277,7 +3278,7 @@
             </a:ln>
             <a:extLst>
               <a:ext uri="{91240B29-F687-4f45-9708-019B960494DF}">
-                <a14:hiddenLine xmlns="" xmlns:a14="http://schemas.microsoft.com/office/drawing/2010/main" w="9525">
+                <a14:hiddenLine xmlns:a14="http://schemas.microsoft.com/office/drawing/2010/main" w="9525">
                   <a:solidFill>
                     <a:srgbClr val="000000"/>
                   </a:solidFill>
@@ -3367,7 +3368,7 @@
             </a:ln>
             <a:extLst>
               <a:ext uri="{91240B29-F687-4f45-9708-019B960494DF}">
-                <a14:hiddenLine xmlns="" xmlns:a14="http://schemas.microsoft.com/office/drawing/2010/main" w="9525">
+                <a14:hiddenLine xmlns:a14="http://schemas.microsoft.com/office/drawing/2010/main" w="9525">
                   <a:solidFill>
                     <a:srgbClr val="000000"/>
                   </a:solidFill>
@@ -3429,7 +3430,7 @@
             </a:ln>
             <a:extLst>
               <a:ext uri="{91240B29-F687-4f45-9708-019B960494DF}">
-                <a14:hiddenLine xmlns="" xmlns:a14="http://schemas.microsoft.com/office/drawing/2010/main" w="9525">
+                <a14:hiddenLine xmlns:a14="http://schemas.microsoft.com/office/drawing/2010/main" w="9525">
                   <a:solidFill>
                     <a:srgbClr val="000000"/>
                   </a:solidFill>
@@ -3519,7 +3520,7 @@
             </a:ln>
             <a:extLst>
               <a:ext uri="{91240B29-F687-4f45-9708-019B960494DF}">
-                <a14:hiddenLine xmlns="" xmlns:a14="http://schemas.microsoft.com/office/drawing/2010/main" w="9525">
+                <a14:hiddenLine xmlns:a14="http://schemas.microsoft.com/office/drawing/2010/main" w="9525">
                   <a:solidFill>
                     <a:srgbClr val="000000"/>
                   </a:solidFill>
@@ -3609,7 +3610,7 @@
             </a:ln>
             <a:extLst>
               <a:ext uri="{91240B29-F687-4f45-9708-019B960494DF}">
-                <a14:hiddenLine xmlns="" xmlns:a14="http://schemas.microsoft.com/office/drawing/2010/main" w="9525">
+                <a14:hiddenLine xmlns:a14="http://schemas.microsoft.com/office/drawing/2010/main" w="9525">
                   <a:solidFill>
                     <a:srgbClr val="000000"/>
                   </a:solidFill>
@@ -3674,7 +3675,7 @@
             </a:ln>
             <a:extLst>
               <a:ext uri="{91240B29-F687-4f45-9708-019B960494DF}">
-                <a14:hiddenLine xmlns="" xmlns:a14="http://schemas.microsoft.com/office/drawing/2010/main" w="9525">
+                <a14:hiddenLine xmlns:a14="http://schemas.microsoft.com/office/drawing/2010/main" w="9525">
                   <a:solidFill>
                     <a:srgbClr val="000000"/>
                   </a:solidFill>
@@ -3736,7 +3737,7 @@
             </a:ln>
             <a:extLst>
               <a:ext uri="{91240B29-F687-4f45-9708-019B960494DF}">
-                <a14:hiddenLine xmlns="" xmlns:a14="http://schemas.microsoft.com/office/drawing/2010/main" w="9525">
+                <a14:hiddenLine xmlns:a14="http://schemas.microsoft.com/office/drawing/2010/main" w="9525">
                   <a:solidFill>
                     <a:srgbClr val="000000"/>
                   </a:solidFill>
@@ -3826,7 +3827,7 @@
             </a:ln>
             <a:extLst>
               <a:ext uri="{91240B29-F687-4f45-9708-019B960494DF}">
-                <a14:hiddenLine xmlns="" xmlns:a14="http://schemas.microsoft.com/office/drawing/2010/main" w="9525">
+                <a14:hiddenLine xmlns:a14="http://schemas.microsoft.com/office/drawing/2010/main" w="9525">
                   <a:solidFill>
                     <a:srgbClr val="000000"/>
                   </a:solidFill>
@@ -3916,7 +3917,7 @@
             </a:ln>
             <a:extLst>
               <a:ext uri="{91240B29-F687-4f45-9708-019B960494DF}">
-                <a14:hiddenLine xmlns="" xmlns:a14="http://schemas.microsoft.com/office/drawing/2010/main" w="9525">
+                <a14:hiddenLine xmlns:a14="http://schemas.microsoft.com/office/drawing/2010/main" w="9525">
                   <a:solidFill>
                     <a:srgbClr val="000000"/>
                   </a:solidFill>
@@ -3978,7 +3979,7 @@
             </a:ln>
             <a:extLst>
               <a:ext uri="{91240B29-F687-4f45-9708-019B960494DF}">
-                <a14:hiddenLine xmlns="" xmlns:a14="http://schemas.microsoft.com/office/drawing/2010/main" w="9525">
+                <a14:hiddenLine xmlns:a14="http://schemas.microsoft.com/office/drawing/2010/main" w="9525">
                   <a:solidFill>
                     <a:srgbClr val="000000"/>
                   </a:solidFill>
@@ -4098,7 +4099,7 @@
             </a:ln>
             <a:extLst>
               <a:ext uri="{91240B29-F687-4f45-9708-019B960494DF}">
-                <a14:hiddenLine xmlns="" xmlns:a14="http://schemas.microsoft.com/office/drawing/2010/main" w="9525">
+                <a14:hiddenLine xmlns:a14="http://schemas.microsoft.com/office/drawing/2010/main" w="9525">
                   <a:solidFill>
                     <a:srgbClr val="000000"/>
                   </a:solidFill>
@@ -4166,7 +4167,7 @@
             </a:ln>
             <a:extLst>
               <a:ext uri="{91240B29-F687-4f45-9708-019B960494DF}">
-                <a14:hiddenLine xmlns="" xmlns:a14="http://schemas.microsoft.com/office/drawing/2010/main" w="9525">
+                <a14:hiddenLine xmlns:a14="http://schemas.microsoft.com/office/drawing/2010/main" w="9525">
                   <a:solidFill>
                     <a:srgbClr val="000000"/>
                   </a:solidFill>
@@ -4256,7 +4257,7 @@
             </a:ln>
             <a:extLst>
               <a:ext uri="{91240B29-F687-4f45-9708-019B960494DF}">
-                <a14:hiddenLine xmlns="" xmlns:a14="http://schemas.microsoft.com/office/drawing/2010/main" w="9525">
+                <a14:hiddenLine xmlns:a14="http://schemas.microsoft.com/office/drawing/2010/main" w="9525">
                   <a:solidFill>
                     <a:srgbClr val="000000"/>
                   </a:solidFill>
@@ -4396,7 +4397,7 @@
           <a:p>
             <a:fld id="{48A87A34-81AB-432B-8DAE-1953F412C126}" type="datetimeFigureOut">
               <a:rPr lang="en-US" dirty="0"/>
-              <a:t>3/15/2016</a:t>
+              <a:t>4/30/16</a:t>
             </a:fld>
             <a:endParaRPr lang="en-US" dirty="0"/>
           </a:p>
@@ -4658,7 +4659,7 @@
           <a:p>
             <a:fld id="{48A87A34-81AB-432B-8DAE-1953F412C126}" type="datetimeFigureOut">
               <a:rPr lang="en-US" dirty="0"/>
-              <a:t>3/15/2016</a:t>
+              <a:t>4/30/16</a:t>
             </a:fld>
             <a:endParaRPr lang="en-US" dirty="0"/>
           </a:p>
@@ -4849,7 +4850,7 @@
           <a:p>
             <a:fld id="{48A87A34-81AB-432B-8DAE-1953F412C126}" type="datetimeFigureOut">
               <a:rPr lang="en-US" dirty="0"/>
-              <a:t>3/15/2016</a:t>
+              <a:t>4/30/16</a:t>
             </a:fld>
             <a:endParaRPr lang="en-US" dirty="0"/>
           </a:p>
@@ -5107,7 +5108,7 @@
           <a:p>
             <a:fld id="{48A87A34-81AB-432B-8DAE-1953F412C126}" type="datetimeFigureOut">
               <a:rPr lang="en-US" dirty="0"/>
-              <a:t>3/15/2016</a:t>
+              <a:t>4/30/16</a:t>
             </a:fld>
             <a:endParaRPr lang="en-US" dirty="0"/>
           </a:p>
@@ -5536,7 +5537,7 @@
           <a:p>
             <a:fld id="{48A87A34-81AB-432B-8DAE-1953F412C126}" type="datetimeFigureOut">
               <a:rPr lang="en-US" dirty="0"/>
-              <a:t>3/15/2016</a:t>
+              <a:t>4/30/16</a:t>
             </a:fld>
             <a:endParaRPr lang="en-US" dirty="0"/>
           </a:p>
@@ -6077,7 +6078,7 @@
           <a:p>
             <a:fld id="{48A87A34-81AB-432B-8DAE-1953F412C126}" type="datetimeFigureOut">
               <a:rPr lang="en-US" dirty="0"/>
-              <a:t>3/15/2016</a:t>
+              <a:t>4/30/16</a:t>
             </a:fld>
             <a:endParaRPr lang="en-US" dirty="0"/>
           </a:p>
@@ -6792,7 +6793,7 @@
           <a:p>
             <a:fld id="{48A87A34-81AB-432B-8DAE-1953F412C126}" type="datetimeFigureOut">
               <a:rPr lang="en-US" dirty="0"/>
-              <a:t>3/15/2016</a:t>
+              <a:t>4/30/16</a:t>
             </a:fld>
             <a:endParaRPr lang="en-US" dirty="0"/>
           </a:p>
@@ -6957,7 +6958,7 @@
           <a:p>
             <a:fld id="{48A87A34-81AB-432B-8DAE-1953F412C126}" type="datetimeFigureOut">
               <a:rPr lang="en-US" dirty="0"/>
-              <a:t>3/15/2016</a:t>
+              <a:t>4/30/16</a:t>
             </a:fld>
             <a:endParaRPr lang="en-US" dirty="0"/>
           </a:p>
@@ -7132,7 +7133,7 @@
           <a:p>
             <a:fld id="{48A87A34-81AB-432B-8DAE-1953F412C126}" type="datetimeFigureOut">
               <a:rPr lang="en-US" dirty="0"/>
-              <a:t>3/15/2016</a:t>
+              <a:t>4/30/16</a:t>
             </a:fld>
             <a:endParaRPr lang="en-US" dirty="0"/>
           </a:p>
@@ -7297,7 +7298,7 @@
           <a:p>
             <a:fld id="{48A87A34-81AB-432B-8DAE-1953F412C126}" type="datetimeFigureOut">
               <a:rPr lang="en-US" dirty="0"/>
-              <a:t>3/15/2016</a:t>
+              <a:t>4/30/16</a:t>
             </a:fld>
             <a:endParaRPr lang="en-US" dirty="0"/>
           </a:p>
@@ -7542,7 +7543,7 @@
           <a:p>
             <a:fld id="{48A87A34-81AB-432B-8DAE-1953F412C126}" type="datetimeFigureOut">
               <a:rPr lang="en-US" dirty="0"/>
-              <a:t>3/15/2016</a:t>
+              <a:t>4/30/16</a:t>
             </a:fld>
             <a:endParaRPr lang="en-US" dirty="0"/>
           </a:p>
@@ -7769,7 +7770,7 @@
           <a:p>
             <a:fld id="{48A87A34-81AB-432B-8DAE-1953F412C126}" type="datetimeFigureOut">
               <a:rPr lang="en-US" dirty="0"/>
-              <a:t>3/15/2016</a:t>
+              <a:t>4/30/16</a:t>
             </a:fld>
             <a:endParaRPr lang="en-US" dirty="0"/>
           </a:p>
@@ -8145,7 +8146,7 @@
           <a:p>
             <a:fld id="{48A87A34-81AB-432B-8DAE-1953F412C126}" type="datetimeFigureOut">
               <a:rPr lang="en-US" dirty="0"/>
-              <a:t>3/15/2016</a:t>
+              <a:t>4/30/16</a:t>
             </a:fld>
             <a:endParaRPr lang="en-US" dirty="0"/>
           </a:p>
@@ -8258,7 +8259,7 @@
           <a:p>
             <a:fld id="{48A87A34-81AB-432B-8DAE-1953F412C126}" type="datetimeFigureOut">
               <a:rPr lang="en-US" dirty="0"/>
-              <a:t>3/15/2016</a:t>
+              <a:t>4/30/16</a:t>
             </a:fld>
             <a:endParaRPr lang="en-US" dirty="0"/>
           </a:p>
@@ -8348,7 +8349,7 @@
           <a:p>
             <a:fld id="{48A87A34-81AB-432B-8DAE-1953F412C126}" type="datetimeFigureOut">
               <a:rPr lang="en-US" dirty="0"/>
-              <a:t>3/15/2016</a:t>
+              <a:t>4/30/16</a:t>
             </a:fld>
             <a:endParaRPr lang="en-US" dirty="0"/>
           </a:p>
@@ -8592,7 +8593,7 @@
           <a:p>
             <a:fld id="{48A87A34-81AB-432B-8DAE-1953F412C126}" type="datetimeFigureOut">
               <a:rPr lang="en-US" dirty="0"/>
-              <a:t>3/15/2016</a:t>
+              <a:t>4/30/16</a:t>
             </a:fld>
             <a:endParaRPr lang="en-US" dirty="0"/>
           </a:p>
@@ -8867,7 +8868,7 @@
           <a:p>
             <a:fld id="{48A87A34-81AB-432B-8DAE-1953F412C126}" type="datetimeFigureOut">
               <a:rPr lang="en-US" dirty="0"/>
-              <a:t>3/15/2016</a:t>
+              <a:t>4/30/16</a:t>
             </a:fld>
             <a:endParaRPr lang="en-US" dirty="0"/>
           </a:p>
@@ -8978,7 +8979,7 @@
           <a:noFill/>
           <a:extLst>
             <a:ext uri="{909E8E84-426E-40dd-AFC4-6F175D3DCCD1}">
-              <a14:hiddenFill xmlns="" xmlns:a14="http://schemas.microsoft.com/office/drawing/2010/main">
+              <a14:hiddenFill xmlns:a14="http://schemas.microsoft.com/office/drawing/2010/main">
                 <a:solidFill>
                   <a:srgbClr val="FFFFFF"/>
                 </a:solidFill>
@@ -9052,7 +9053,7 @@
               </a:ln>
               <a:extLst>
                 <a:ext uri="{91240B29-F687-4f45-9708-019B960494DF}">
-                  <a14:hiddenLine xmlns="" xmlns:a14="http://schemas.microsoft.com/office/drawing/2010/main" w="9525">
+                  <a14:hiddenLine xmlns:a14="http://schemas.microsoft.com/office/drawing/2010/main" w="9525">
                     <a:solidFill>
                       <a:srgbClr val="000000"/>
                     </a:solidFill>
@@ -9142,7 +9143,7 @@
               </a:ln>
               <a:extLst>
                 <a:ext uri="{91240B29-F687-4f45-9708-019B960494DF}">
-                  <a14:hiddenLine xmlns="" xmlns:a14="http://schemas.microsoft.com/office/drawing/2010/main" w="9525">
+                  <a14:hiddenLine xmlns:a14="http://schemas.microsoft.com/office/drawing/2010/main" w="9525">
                     <a:solidFill>
                       <a:srgbClr val="000000"/>
                     </a:solidFill>
@@ -9232,7 +9233,7 @@
               </a:ln>
               <a:extLst>
                 <a:ext uri="{91240B29-F687-4f45-9708-019B960494DF}">
-                  <a14:hiddenLine xmlns="" xmlns:a14="http://schemas.microsoft.com/office/drawing/2010/main" w="9525">
+                  <a14:hiddenLine xmlns:a14="http://schemas.microsoft.com/office/drawing/2010/main" w="9525">
                     <a:solidFill>
                       <a:srgbClr val="000000"/>
                     </a:solidFill>
@@ -9294,7 +9295,7 @@
               </a:ln>
               <a:extLst>
                 <a:ext uri="{91240B29-F687-4f45-9708-019B960494DF}">
-                  <a14:hiddenLine xmlns="" xmlns:a14="http://schemas.microsoft.com/office/drawing/2010/main" w="9525">
+                  <a14:hiddenLine xmlns:a14="http://schemas.microsoft.com/office/drawing/2010/main" w="9525">
                     <a:solidFill>
                       <a:srgbClr val="000000"/>
                     </a:solidFill>
@@ -9384,7 +9385,7 @@
               </a:ln>
               <a:extLst>
                 <a:ext uri="{91240B29-F687-4f45-9708-019B960494DF}">
-                  <a14:hiddenLine xmlns="" xmlns:a14="http://schemas.microsoft.com/office/drawing/2010/main" w="9525">
+                  <a14:hiddenLine xmlns:a14="http://schemas.microsoft.com/office/drawing/2010/main" w="9525">
                     <a:solidFill>
                       <a:srgbClr val="000000"/>
                     </a:solidFill>
@@ -9446,7 +9447,7 @@
               </a:ln>
               <a:extLst>
                 <a:ext uri="{91240B29-F687-4f45-9708-019B960494DF}">
-                  <a14:hiddenLine xmlns="" xmlns:a14="http://schemas.microsoft.com/office/drawing/2010/main" w="9525">
+                  <a14:hiddenLine xmlns:a14="http://schemas.microsoft.com/office/drawing/2010/main" w="9525">
                     <a:solidFill>
                       <a:srgbClr val="000000"/>
                     </a:solidFill>
@@ -9508,7 +9509,7 @@
               </a:ln>
               <a:extLst>
                 <a:ext uri="{91240B29-F687-4f45-9708-019B960494DF}">
-                  <a14:hiddenLine xmlns="" xmlns:a14="http://schemas.microsoft.com/office/drawing/2010/main" w="9525">
+                  <a14:hiddenLine xmlns:a14="http://schemas.microsoft.com/office/drawing/2010/main" w="9525">
                     <a:solidFill>
                       <a:srgbClr val="000000"/>
                     </a:solidFill>
@@ -9598,7 +9599,7 @@
               </a:ln>
               <a:extLst>
                 <a:ext uri="{91240B29-F687-4f45-9708-019B960494DF}">
-                  <a14:hiddenLine xmlns="" xmlns:a14="http://schemas.microsoft.com/office/drawing/2010/main" w="9525">
+                  <a14:hiddenLine xmlns:a14="http://schemas.microsoft.com/office/drawing/2010/main" w="9525">
                     <a:solidFill>
                       <a:srgbClr val="000000"/>
                     </a:solidFill>
@@ -9688,7 +9689,7 @@
               </a:ln>
               <a:extLst>
                 <a:ext uri="{91240B29-F687-4f45-9708-019B960494DF}">
-                  <a14:hiddenLine xmlns="" xmlns:a14="http://schemas.microsoft.com/office/drawing/2010/main" w="9525">
+                  <a14:hiddenLine xmlns:a14="http://schemas.microsoft.com/office/drawing/2010/main" w="9525">
                     <a:solidFill>
                       <a:srgbClr val="000000"/>
                     </a:solidFill>
@@ -9750,7 +9751,7 @@
               </a:ln>
               <a:extLst>
                 <a:ext uri="{91240B29-F687-4f45-9708-019B960494DF}">
-                  <a14:hiddenLine xmlns="" xmlns:a14="http://schemas.microsoft.com/office/drawing/2010/main" w="9525">
+                  <a14:hiddenLine xmlns:a14="http://schemas.microsoft.com/office/drawing/2010/main" w="9525">
                     <a:solidFill>
                       <a:srgbClr val="000000"/>
                     </a:solidFill>
@@ -9860,7 +9861,7 @@
               </a:ln>
               <a:extLst>
                 <a:ext uri="{91240B29-F687-4f45-9708-019B960494DF}">
-                  <a14:hiddenLine xmlns="" xmlns:a14="http://schemas.microsoft.com/office/drawing/2010/main" w="9525">
+                  <a14:hiddenLine xmlns:a14="http://schemas.microsoft.com/office/drawing/2010/main" w="9525">
                     <a:solidFill>
                       <a:srgbClr val="000000"/>
                     </a:solidFill>
@@ -9944,7 +9945,7 @@
               </a:ln>
               <a:extLst>
                 <a:ext uri="{91240B29-F687-4f45-9708-019B960494DF}">
-                  <a14:hiddenLine xmlns="" xmlns:a14="http://schemas.microsoft.com/office/drawing/2010/main" w="9525">
+                  <a14:hiddenLine xmlns:a14="http://schemas.microsoft.com/office/drawing/2010/main" w="9525">
                     <a:solidFill>
                       <a:srgbClr val="000000"/>
                     </a:solidFill>
@@ -10006,7 +10007,7 @@
               </a:ln>
               <a:extLst>
                 <a:ext uri="{91240B29-F687-4f45-9708-019B960494DF}">
-                  <a14:hiddenLine xmlns="" xmlns:a14="http://schemas.microsoft.com/office/drawing/2010/main" w="9525">
+                  <a14:hiddenLine xmlns:a14="http://schemas.microsoft.com/office/drawing/2010/main" w="9525">
                     <a:solidFill>
                       <a:srgbClr val="000000"/>
                     </a:solidFill>
@@ -10068,7 +10069,7 @@
               </a:ln>
               <a:extLst>
                 <a:ext uri="{91240B29-F687-4f45-9708-019B960494DF}">
-                  <a14:hiddenLine xmlns="" xmlns:a14="http://schemas.microsoft.com/office/drawing/2010/main" w="9525">
+                  <a14:hiddenLine xmlns:a14="http://schemas.microsoft.com/office/drawing/2010/main" w="9525">
                     <a:solidFill>
                       <a:srgbClr val="000000"/>
                     </a:solidFill>
@@ -10158,7 +10159,7 @@
               </a:ln>
               <a:extLst>
                 <a:ext uri="{91240B29-F687-4f45-9708-019B960494DF}">
-                  <a14:hiddenLine xmlns="" xmlns:a14="http://schemas.microsoft.com/office/drawing/2010/main" w="9525">
+                  <a14:hiddenLine xmlns:a14="http://schemas.microsoft.com/office/drawing/2010/main" w="9525">
                     <a:solidFill>
                       <a:srgbClr val="000000"/>
                     </a:solidFill>
@@ -10192,7 +10193,7 @@
               </a:ln>
               <a:extLst>
                 <a:ext uri="{91240B29-F687-4f45-9708-019B960494DF}">
-                  <a14:hiddenLine xmlns="" xmlns:a14="http://schemas.microsoft.com/office/drawing/2010/main" w="9525">
+                  <a14:hiddenLine xmlns:a14="http://schemas.microsoft.com/office/drawing/2010/main" w="9525">
                     <a:solidFill>
                       <a:srgbClr val="000000"/>
                     </a:solidFill>
@@ -10257,7 +10258,7 @@
               </a:ln>
               <a:extLst>
                 <a:ext uri="{91240B29-F687-4f45-9708-019B960494DF}">
-                  <a14:hiddenLine xmlns="" xmlns:a14="http://schemas.microsoft.com/office/drawing/2010/main" w="9525">
+                  <a14:hiddenLine xmlns:a14="http://schemas.microsoft.com/office/drawing/2010/main" w="9525">
                     <a:solidFill>
                       <a:srgbClr val="000000"/>
                     </a:solidFill>
@@ -10347,7 +10348,7 @@
               </a:ln>
               <a:extLst>
                 <a:ext uri="{91240B29-F687-4f45-9708-019B960494DF}">
-                  <a14:hiddenLine xmlns="" xmlns:a14="http://schemas.microsoft.com/office/drawing/2010/main" w="9525">
+                  <a14:hiddenLine xmlns:a14="http://schemas.microsoft.com/office/drawing/2010/main" w="9525">
                     <a:solidFill>
                       <a:srgbClr val="000000"/>
                     </a:solidFill>
@@ -10409,7 +10410,7 @@
               </a:ln>
               <a:extLst>
                 <a:ext uri="{91240B29-F687-4f45-9708-019B960494DF}">
-                  <a14:hiddenLine xmlns="" xmlns:a14="http://schemas.microsoft.com/office/drawing/2010/main" w="9525">
+                  <a14:hiddenLine xmlns:a14="http://schemas.microsoft.com/office/drawing/2010/main" w="9525">
                     <a:solidFill>
                       <a:srgbClr val="000000"/>
                     </a:solidFill>
@@ -10499,7 +10500,7 @@
               </a:ln>
               <a:extLst>
                 <a:ext uri="{91240B29-F687-4f45-9708-019B960494DF}">
-                  <a14:hiddenLine xmlns="" xmlns:a14="http://schemas.microsoft.com/office/drawing/2010/main" w="9525">
+                  <a14:hiddenLine xmlns:a14="http://schemas.microsoft.com/office/drawing/2010/main" w="9525">
                     <a:solidFill>
                       <a:srgbClr val="000000"/>
                     </a:solidFill>
@@ -10564,7 +10565,7 @@
               </a:ln>
               <a:extLst>
                 <a:ext uri="{91240B29-F687-4f45-9708-019B960494DF}">
-                  <a14:hiddenLine xmlns="" xmlns:a14="http://schemas.microsoft.com/office/drawing/2010/main" w="9525">
+                  <a14:hiddenLine xmlns:a14="http://schemas.microsoft.com/office/drawing/2010/main" w="9525">
                     <a:solidFill>
                       <a:srgbClr val="000000"/>
                     </a:solidFill>
@@ -10626,7 +10627,7 @@
               </a:ln>
               <a:extLst>
                 <a:ext uri="{91240B29-F687-4f45-9708-019B960494DF}">
-                  <a14:hiddenLine xmlns="" xmlns:a14="http://schemas.microsoft.com/office/drawing/2010/main" w="9525">
+                  <a14:hiddenLine xmlns:a14="http://schemas.microsoft.com/office/drawing/2010/main" w="9525">
                     <a:solidFill>
                       <a:srgbClr val="000000"/>
                     </a:solidFill>
@@ -10716,7 +10717,7 @@
               </a:ln>
               <a:extLst>
                 <a:ext uri="{91240B29-F687-4f45-9708-019B960494DF}">
-                  <a14:hiddenLine xmlns="" xmlns:a14="http://schemas.microsoft.com/office/drawing/2010/main" w="9525">
+                  <a14:hiddenLine xmlns:a14="http://schemas.microsoft.com/office/drawing/2010/main" w="9525">
                     <a:solidFill>
                       <a:srgbClr val="000000"/>
                     </a:solidFill>
@@ -10806,7 +10807,7 @@
               </a:ln>
               <a:extLst>
                 <a:ext uri="{91240B29-F687-4f45-9708-019B960494DF}">
-                  <a14:hiddenLine xmlns="" xmlns:a14="http://schemas.microsoft.com/office/drawing/2010/main" w="9525">
+                  <a14:hiddenLine xmlns:a14="http://schemas.microsoft.com/office/drawing/2010/main" w="9525">
                     <a:solidFill>
                       <a:srgbClr val="000000"/>
                     </a:solidFill>
@@ -10871,7 +10872,7 @@
               </a:ln>
               <a:extLst>
                 <a:ext uri="{91240B29-F687-4f45-9708-019B960494DF}">
-                  <a14:hiddenLine xmlns="" xmlns:a14="http://schemas.microsoft.com/office/drawing/2010/main" w="9525">
+                  <a14:hiddenLine xmlns:a14="http://schemas.microsoft.com/office/drawing/2010/main" w="9525">
                     <a:solidFill>
                       <a:srgbClr val="000000"/>
                     </a:solidFill>
@@ -10991,7 +10992,7 @@
               </a:ln>
               <a:extLst>
                 <a:ext uri="{91240B29-F687-4f45-9708-019B960494DF}">
-                  <a14:hiddenLine xmlns="" xmlns:a14="http://schemas.microsoft.com/office/drawing/2010/main" w="9525">
+                  <a14:hiddenLine xmlns:a14="http://schemas.microsoft.com/office/drawing/2010/main" w="9525">
                     <a:solidFill>
                       <a:srgbClr val="000000"/>
                     </a:solidFill>
@@ -11089,7 +11090,7 @@
               </a:ln>
               <a:extLst>
                 <a:ext uri="{91240B29-F687-4f45-9708-019B960494DF}">
-                  <a14:hiddenLine xmlns="" xmlns:a14="http://schemas.microsoft.com/office/drawing/2010/main" w="9525">
+                  <a14:hiddenLine xmlns:a14="http://schemas.microsoft.com/office/drawing/2010/main" w="9525">
                     <a:solidFill>
                       <a:srgbClr val="000000"/>
                     </a:solidFill>
@@ -11204,7 +11205,7 @@
               </a:ln>
               <a:extLst>
                 <a:ext uri="{91240B29-F687-4f45-9708-019B960494DF}">
-                  <a14:hiddenLine xmlns="" xmlns:a14="http://schemas.microsoft.com/office/drawing/2010/main" w="9525">
+                  <a14:hiddenLine xmlns:a14="http://schemas.microsoft.com/office/drawing/2010/main" w="9525">
                     <a:solidFill>
                       <a:srgbClr val="000000"/>
                     </a:solidFill>
@@ -11294,7 +11295,7 @@
               </a:ln>
               <a:extLst>
                 <a:ext uri="{91240B29-F687-4f45-9708-019B960494DF}">
-                  <a14:hiddenLine xmlns="" xmlns:a14="http://schemas.microsoft.com/office/drawing/2010/main" w="9525">
+                  <a14:hiddenLine xmlns:a14="http://schemas.microsoft.com/office/drawing/2010/main" w="9525">
                     <a:solidFill>
                       <a:srgbClr val="000000"/>
                     </a:solidFill>
@@ -11359,7 +11360,7 @@
               </a:ln>
               <a:extLst>
                 <a:ext uri="{91240B29-F687-4f45-9708-019B960494DF}">
-                  <a14:hiddenLine xmlns="" xmlns:a14="http://schemas.microsoft.com/office/drawing/2010/main" w="9525">
+                  <a14:hiddenLine xmlns:a14="http://schemas.microsoft.com/office/drawing/2010/main" w="9525">
                     <a:solidFill>
                       <a:srgbClr val="000000"/>
                     </a:solidFill>
@@ -11449,7 +11450,7 @@
               </a:ln>
               <a:extLst>
                 <a:ext uri="{91240B29-F687-4f45-9708-019B960494DF}">
-                  <a14:hiddenLine xmlns="" xmlns:a14="http://schemas.microsoft.com/office/drawing/2010/main" w="9525">
+                  <a14:hiddenLine xmlns:a14="http://schemas.microsoft.com/office/drawing/2010/main" w="9525">
                     <a:solidFill>
                       <a:srgbClr val="000000"/>
                     </a:solidFill>
@@ -11517,7 +11518,7 @@
               </a:ln>
               <a:extLst>
                 <a:ext uri="{91240B29-F687-4f45-9708-019B960494DF}">
-                  <a14:hiddenLine xmlns="" xmlns:a14="http://schemas.microsoft.com/office/drawing/2010/main" w="9525">
+                  <a14:hiddenLine xmlns:a14="http://schemas.microsoft.com/office/drawing/2010/main" w="9525">
                     <a:solidFill>
                       <a:srgbClr val="000000"/>
                     </a:solidFill>
@@ -11607,7 +11608,7 @@
               </a:ln>
               <a:extLst>
                 <a:ext uri="{91240B29-F687-4f45-9708-019B960494DF}">
-                  <a14:hiddenLine xmlns="" xmlns:a14="http://schemas.microsoft.com/office/drawing/2010/main" w="9525">
+                  <a14:hiddenLine xmlns:a14="http://schemas.microsoft.com/office/drawing/2010/main" w="9525">
                     <a:solidFill>
                       <a:srgbClr val="000000"/>
                     </a:solidFill>
@@ -11675,7 +11676,7 @@
               </a:ln>
               <a:extLst>
                 <a:ext uri="{91240B29-F687-4f45-9708-019B960494DF}">
-                  <a14:hiddenLine xmlns="" xmlns:a14="http://schemas.microsoft.com/office/drawing/2010/main" w="9525">
+                  <a14:hiddenLine xmlns:a14="http://schemas.microsoft.com/office/drawing/2010/main" w="9525">
                     <a:solidFill>
                       <a:srgbClr val="000000"/>
                     </a:solidFill>
@@ -11765,7 +11766,7 @@
               </a:ln>
               <a:extLst>
                 <a:ext uri="{91240B29-F687-4f45-9708-019B960494DF}">
-                  <a14:hiddenLine xmlns="" xmlns:a14="http://schemas.microsoft.com/office/drawing/2010/main" w="9525">
+                  <a14:hiddenLine xmlns:a14="http://schemas.microsoft.com/office/drawing/2010/main" w="9525">
                     <a:solidFill>
                       <a:srgbClr val="000000"/>
                     </a:solidFill>
@@ -11799,7 +11800,7 @@
               </a:ln>
               <a:extLst>
                 <a:ext uri="{91240B29-F687-4f45-9708-019B960494DF}">
-                  <a14:hiddenLine xmlns="" xmlns:a14="http://schemas.microsoft.com/office/drawing/2010/main" w="9525">
+                  <a14:hiddenLine xmlns:a14="http://schemas.microsoft.com/office/drawing/2010/main" w="9525">
                     <a:solidFill>
                       <a:srgbClr val="000000"/>
                     </a:solidFill>
@@ -11940,7 +11941,7 @@
             <a:fld id="{48A87A34-81AB-432B-8DAE-1953F412C126}" type="datetimeFigureOut">
               <a:rPr lang="en-US" dirty="0"/>
               <a:pPr/>
-              <a:t>3/15/2016</a:t>
+              <a:t>4/30/16</a:t>
             </a:fld>
             <a:endParaRPr lang="en-US" dirty="0"/>
           </a:p>
@@ -12406,7 +12407,6 @@
               <a:rPr lang="en-US" dirty="0" smtClean="0"/>
               <a:t>              </a:t>
             </a:r>
-            <a:endParaRPr lang="en-US" dirty="0" smtClean="0"/>
           </a:p>
           <a:p>
             <a:endParaRPr lang="en-US" dirty="0" smtClean="0"/>
@@ -12422,9 +12422,6 @@
               </a:rPr>
               <a:t>BY </a:t>
             </a:r>
-            <a:endParaRPr lang="en-US" dirty="0" smtClean="0">
-              <a:latin typeface="Calibri" panose="020F0502020204030204" pitchFamily="34" charset="0"/>
-            </a:endParaRPr>
           </a:p>
           <a:p>
             <a:r>
@@ -12458,9 +12455,6 @@
               </a:rPr>
               <a:t>POPTANI</a:t>
             </a:r>
-            <a:endParaRPr lang="en-US" dirty="0">
-              <a:latin typeface="Calibri" panose="020F0502020204030204" pitchFamily="34" charset="0"/>
-            </a:endParaRPr>
           </a:p>
         </p:txBody>
       </p:sp>
@@ -12501,7 +12495,7 @@
   <p:timing>
     <p:tnLst>
       <p:par>
-        <p:cTn id="1" dur="indefinite" restart="never" nodeType="tmRoot">
+        <p:cTn xmlns:p14="http://schemas.microsoft.com/office/powerpoint/2010/main" id="1" dur="indefinite" restart="never" nodeType="tmRoot">
           <p:childTnLst>
             <p:seq concurrent="1" nextAc="seek">
               <p:cTn id="2" dur="indefinite" nodeType="mainSeq">
@@ -13085,6 +13079,106 @@
 </p:sld>
 </file>
 
+<file path=ppt/slides/slide10.xml><?xml version="1.0" encoding="utf-8"?>
+<p:sld xmlns:a="http://schemas.openxmlformats.org/drawingml/2006/main" xmlns:r="http://schemas.openxmlformats.org/officeDocument/2006/relationships" xmlns:p="http://schemas.openxmlformats.org/presentationml/2006/main">
+  <p:cSld>
+    <p:spTree>
+      <p:nvGrpSpPr>
+        <p:cNvPr id="1" name=""/>
+        <p:cNvGrpSpPr/>
+        <p:nvPr/>
+      </p:nvGrpSpPr>
+      <p:grpSpPr>
+        <a:xfrm>
+          <a:off x="0" y="0"/>
+          <a:ext cx="0" cy="0"/>
+          <a:chOff x="0" y="0"/>
+          <a:chExt cx="0" cy="0"/>
+        </a:xfrm>
+      </p:grpSpPr>
+      <p:sp>
+        <p:nvSpPr>
+          <p:cNvPr id="2" name="Title 1"/>
+          <p:cNvSpPr>
+            <a:spLocks noGrp="1"/>
+          </p:cNvSpPr>
+          <p:nvPr>
+            <p:ph type="title"/>
+          </p:nvPr>
+        </p:nvSpPr>
+        <p:spPr/>
+        <p:txBody>
+          <a:bodyPr>
+            <a:normAutofit/>
+          </a:bodyPr>
+          <a:lstStyle/>
+          <a:p>
+            <a:pPr algn="ctr"/>
+            <a:r>
+              <a:rPr lang="en-US" b="1" dirty="0" smtClean="0">
+                <a:latin typeface="Calibri" panose="020F0502020204030204" pitchFamily="34" charset="0"/>
+              </a:rPr>
+              <a:t>Thank you </a:t>
+            </a:r>
+            <a:r>
+              <a:rPr lang="en-US" b="1" dirty="0" smtClean="0">
+                <a:latin typeface="Calibri" panose="020F0502020204030204" pitchFamily="34" charset="0"/>
+                <a:sym typeface="Wingdings" panose="05000000000000000000" pitchFamily="2" charset="2"/>
+              </a:rPr>
+              <a:t> </a:t>
+            </a:r>
+            <a:endParaRPr lang="en-US" b="1" dirty="0">
+              <a:latin typeface="Calibri" panose="020F0502020204030204" pitchFamily="34" charset="0"/>
+            </a:endParaRPr>
+          </a:p>
+        </p:txBody>
+      </p:sp>
+      <p:pic>
+        <p:nvPicPr>
+          <p:cNvPr id="4" name="Content Placeholder 3"/>
+          <p:cNvPicPr>
+            <a:picLocks noGrp="1" noChangeAspect="1"/>
+          </p:cNvPicPr>
+          <p:nvPr>
+            <p:ph idx="1"/>
+          </p:nvPr>
+        </p:nvPicPr>
+        <p:blipFill>
+          <a:blip r:embed="rId2"/>
+          <a:stretch>
+            <a:fillRect/>
+          </a:stretch>
+        </p:blipFill>
+        <p:spPr>
+          <a:xfrm>
+            <a:off x="4459829" y="2197236"/>
+            <a:ext cx="3269166" cy="3541712"/>
+          </a:xfrm>
+          <a:prstGeom prst="rect">
+            <a:avLst/>
+          </a:prstGeom>
+        </p:spPr>
+      </p:pic>
+    </p:spTree>
+    <p:extLst>
+      <p:ext uri="{BB962C8B-B14F-4D97-AF65-F5344CB8AC3E}">
+        <p14:creationId xmlns:p14="http://schemas.microsoft.com/office/powerpoint/2010/main" val="2289731778"/>
+      </p:ext>
+    </p:extLst>
+  </p:cSld>
+  <p:clrMapOvr>
+    <a:masterClrMapping/>
+  </p:clrMapOvr>
+  <p:timing>
+    <p:tnLst>
+      <p:par>
+        <p:cTn xmlns:p14="http://schemas.microsoft.com/office/powerpoint/2010/main" id="1" dur="indefinite" restart="never" nodeType="tmRoot"/>
+      </p:par>
+    </p:tnLst>
+  </p:timing>
+</p:sld>
+</file>
+
 <file path=ppt/slides/slide2.xml><?xml version="1.0" encoding="utf-8"?>
 <p:sld xmlns:a="http://schemas.openxmlformats.org/drawingml/2006/main" xmlns:r="http://schemas.openxmlformats.org/officeDocument/2006/relationships" xmlns:p="http://schemas.openxmlformats.org/presentationml/2006/main">
   <p:cSld>
@@ -13150,19 +13244,7 @@
               <a:rPr lang="en-US" dirty="0" smtClean="0">
                 <a:latin typeface="Calibri" panose="020F0502020204030204" pitchFamily="34" charset="0"/>
               </a:rPr>
-              <a:t>o efficiently utilize fraction of </a:t>
-            </a:r>
-            <a:r>
-              <a:rPr lang="en-US" dirty="0" smtClean="0">
-                <a:latin typeface="Calibri" panose="020F0502020204030204" pitchFamily="34" charset="0"/>
-              </a:rPr>
-              <a:t>time when </a:t>
-            </a:r>
-            <a:r>
-              <a:rPr lang="en-US" dirty="0" smtClean="0">
-                <a:latin typeface="Calibri" panose="020F0502020204030204" pitchFamily="34" charset="0"/>
-              </a:rPr>
-              <a:t>taxi is on road</a:t>
+              <a:t>o efficiently utilize fraction of time when taxi is on road</a:t>
             </a:r>
           </a:p>
           <a:p>
@@ -13209,7 +13291,7 @@
   <p:timing>
     <p:tnLst>
       <p:par>
-        <p:cTn id="1" dur="indefinite" restart="never" nodeType="tmRoot">
+        <p:cTn xmlns:p14="http://schemas.microsoft.com/office/powerpoint/2010/main" id="1" dur="indefinite" restart="never" nodeType="tmRoot">
           <p:childTnLst>
             <p:seq concurrent="1" nextAc="seek">
               <p:cTn id="2" dur="indefinite" nodeType="mainSeq">
@@ -13787,27 +13869,15 @@
               <a:rPr lang="en-US" dirty="0" smtClean="0">
                 <a:latin typeface="Calibri" panose="020F0502020204030204" pitchFamily="34" charset="0"/>
               </a:rPr>
-              <a:t>Analyzing geospatial proximities of region using ESRI geometry </a:t>
-            </a:r>
+              <a:t>Analyzing geospatial proximities of region using ESRI geometry API</a:t>
+            </a:r>
+          </a:p>
+          <a:p>
             <a:r>
               <a:rPr lang="en-US" dirty="0" smtClean="0">
                 <a:latin typeface="Calibri" panose="020F0502020204030204" pitchFamily="34" charset="0"/>
               </a:rPr>
-              <a:t>API</a:t>
-            </a:r>
-          </a:p>
-          <a:p>
-            <a:r>
-              <a:rPr lang="en-US" dirty="0" smtClean="0">
-                <a:latin typeface="Calibri" panose="020F0502020204030204" pitchFamily="34" charset="0"/>
-              </a:rPr>
-              <a:t>Using </a:t>
-            </a:r>
-            <a:r>
-              <a:rPr lang="en-US" dirty="0" smtClean="0">
-                <a:latin typeface="Calibri" panose="020F0502020204030204" pitchFamily="34" charset="0"/>
-              </a:rPr>
-              <a:t>spray-</a:t>
+              <a:t>Using spray-</a:t>
             </a:r>
             <a:r>
               <a:rPr lang="en-US" dirty="0" err="1" smtClean="0">
@@ -13819,13 +13889,7 @@
               <a:rPr lang="en-US" dirty="0" smtClean="0">
                 <a:latin typeface="Calibri" panose="020F0502020204030204" pitchFamily="34" charset="0"/>
               </a:rPr>
-              <a:t> library to work with GEOJSON </a:t>
-            </a:r>
-            <a:r>
-              <a:rPr lang="en-US" dirty="0" smtClean="0">
-                <a:latin typeface="Calibri" panose="020F0502020204030204" pitchFamily="34" charset="0"/>
-              </a:rPr>
-              <a:t>data</a:t>
+              <a:t> library to work with GEOJSON data</a:t>
             </a:r>
           </a:p>
           <a:p>
@@ -13841,9 +13905,6 @@
               </a:rPr>
               <a:t>boroughs</a:t>
             </a:r>
-            <a:endParaRPr lang="en-US" dirty="0" smtClean="0">
-              <a:latin typeface="Calibri" panose="020F0502020204030204" pitchFamily="34" charset="0"/>
-            </a:endParaRPr>
           </a:p>
           <a:p>
             <a:r>
@@ -13862,13 +13923,7 @@
               <a:rPr lang="en-US" dirty="0" smtClean="0">
                 <a:latin typeface="Calibri" panose="020F0502020204030204" pitchFamily="34" charset="0"/>
               </a:rPr>
-              <a:t> </a:t>
-            </a:r>
-            <a:r>
-              <a:rPr lang="en-US" dirty="0" smtClean="0">
-                <a:latin typeface="Calibri" panose="020F0502020204030204" pitchFamily="34" charset="0"/>
-              </a:rPr>
-              <a:t>framework</a:t>
+              <a:t> framework</a:t>
             </a:r>
           </a:p>
           <a:p>
@@ -13897,7 +13952,7 @@
   <p:timing>
     <p:tnLst>
       <p:par>
-        <p:cTn id="1" dur="indefinite" restart="never" nodeType="tmRoot">
+        <p:cTn xmlns:p14="http://schemas.microsoft.com/office/powerpoint/2010/main" id="1" dur="indefinite" restart="never" nodeType="tmRoot">
           <p:childTnLst>
             <p:seq concurrent="1" nextAc="seek">
               <p:cTn id="2" dur="indefinite" nodeType="mainSeq">
@@ -14977,31 +15032,7 @@
               <a:rPr lang="en-US" sz="1800" dirty="0" smtClean="0">
                 <a:latin typeface="Calibri" panose="020F0502020204030204" pitchFamily="34" charset="0"/>
               </a:rPr>
-              <a:t> Transportation Systems(VTS) or Mobile Knowledge Systems(CMT) </a:t>
-            </a:r>
-            <a:r>
-              <a:rPr lang="en-US" sz="1800" dirty="0" smtClean="0">
-                <a:latin typeface="Calibri" panose="020F0502020204030204" pitchFamily="34" charset="0"/>
-              </a:rPr>
-              <a:t>			      implemented </a:t>
-            </a:r>
-            <a:r>
-              <a:rPr lang="en-US" sz="1800" dirty="0" smtClean="0">
-                <a:latin typeface="Calibri" panose="020F0502020204030204" pitchFamily="34" charset="0"/>
-              </a:rPr>
-              <a:t>as </a:t>
-            </a:r>
-            <a:r>
-              <a:rPr lang="en-US" sz="1800" dirty="0" smtClean="0">
-                <a:latin typeface="Calibri" panose="020F0502020204030204" pitchFamily="34" charset="0"/>
-              </a:rPr>
-              <a:t>part  </a:t>
-            </a:r>
-            <a:r>
-              <a:rPr lang="en-US" sz="1800" dirty="0" smtClean="0">
-                <a:latin typeface="Calibri" panose="020F0502020204030204" pitchFamily="34" charset="0"/>
-              </a:rPr>
-              <a:t>of Technology Passenger Enhancements Project</a:t>
+              <a:t> Transportation Systems(VTS) or Mobile Knowledge Systems(CMT) 			      implemented as part  of Technology Passenger Enhancements Project</a:t>
             </a:r>
           </a:p>
           <a:p>
@@ -15042,7 +15073,7 @@
   <p:timing>
     <p:tnLst>
       <p:par>
-        <p:cTn id="1" dur="indefinite" restart="never" nodeType="tmRoot">
+        <p:cTn xmlns:p14="http://schemas.microsoft.com/office/powerpoint/2010/main" id="1" dur="indefinite" restart="never" nodeType="tmRoot">
           <p:childTnLst>
             <p:seq concurrent="1" nextAc="seek">
               <p:cTn id="2" dur="indefinite" nodeType="mainSeq">
@@ -16399,7 +16430,7 @@
   <p:timing>
     <p:tnLst>
       <p:par>
-        <p:cTn id="1" dur="indefinite" restart="never" nodeType="tmRoot">
+        <p:cTn xmlns:p14="http://schemas.microsoft.com/office/powerpoint/2010/main" id="1" dur="indefinite" restart="never" nodeType="tmRoot">
           <p:childTnLst>
             <p:seq concurrent="1" nextAc="seek">
               <p:cTn id="2" dur="indefinite" nodeType="mainSeq">
@@ -17378,7 +17409,7 @@
             <p:ph idx="1"/>
             <p:extLst>
               <p:ext uri="{D42A27DB-BD31-4B8C-83A1-F6EECF244321}">
-                <p14:modId xmlns:p14="http://schemas.microsoft.com/office/powerpoint/2010/main" val="3197838500"/>
+                <p14:modId xmlns:p14="http://schemas.microsoft.com/office/powerpoint/2010/main" val="1183454247"/>
               </p:ext>
             </p:extLst>
           </p:nvPr>
@@ -17517,7 +17548,13 @@
                         <a:rPr lang="en-US" baseline="0" dirty="0" smtClean="0">
                           <a:latin typeface="Calibri" panose="020F0502020204030204" pitchFamily="34" charset="0"/>
                         </a:rPr>
-                        <a:t> ESRI FRAMEWORK</a:t>
+                        <a:t> ESRI </a:t>
+                      </a:r>
+                      <a:r>
+                        <a:rPr lang="en-US" baseline="0" dirty="0" smtClean="0">
+                          <a:latin typeface="Calibri" panose="020F0502020204030204" pitchFamily="34" charset="0"/>
+                        </a:rPr>
+                        <a:t>FRAMEWORK</a:t>
                       </a:r>
                       <a:endParaRPr lang="en-US" dirty="0">
                         <a:latin typeface="Calibri" panose="020F0502020204030204" pitchFamily="34" charset="0"/>
@@ -17556,6 +17593,18 @@
                           <a:latin typeface="Calibri" panose="020F0502020204030204" pitchFamily="34" charset="0"/>
                         </a:rPr>
                         <a:t>SCALA CODE </a:t>
+                      </a:r>
+                      <a:r>
+                        <a:rPr lang="en-US" dirty="0" smtClean="0">
+                          <a:latin typeface="Calibri" panose="020F0502020204030204" pitchFamily="34" charset="0"/>
+                        </a:rPr>
+                        <a:t>TO</a:t>
+                      </a:r>
+                      <a:r>
+                        <a:rPr lang="en-US" baseline="0" dirty="0" smtClean="0">
+                          <a:latin typeface="Calibri" panose="020F0502020204030204" pitchFamily="34" charset="0"/>
+                        </a:rPr>
+                        <a:t> CALCULATE BROWNIE POINT</a:t>
                       </a:r>
                       <a:endParaRPr lang="en-US" dirty="0">
                         <a:latin typeface="Calibri" panose="020F0502020204030204" pitchFamily="34" charset="0"/>
@@ -17638,7 +17687,7 @@
   <p:timing>
     <p:tnLst>
       <p:par>
-        <p:cTn id="1" dur="indefinite" restart="never" nodeType="tmRoot">
+        <p:cTn xmlns:p14="http://schemas.microsoft.com/office/powerpoint/2010/main" id="1" dur="indefinite" restart="never" nodeType="tmRoot">
           <p:childTnLst>
             <p:seq concurrent="1" nextAc="seek">
               <p:cTn id="2" dur="indefinite" nodeType="mainSeq">
@@ -18015,7 +18064,7 @@
   <p:timing>
     <p:tnLst>
       <p:par>
-        <p:cTn id="1" dur="indefinite" restart="never" nodeType="tmRoot">
+        <p:cTn xmlns:p14="http://schemas.microsoft.com/office/powerpoint/2010/main" id="1" dur="indefinite" restart="never" nodeType="tmRoot">
           <p:childTnLst>
             <p:seq concurrent="1" nextAc="seek">
               <p:cTn id="2" dur="indefinite" nodeType="mainSeq">
@@ -18733,13 +18782,7 @@
               <a:rPr lang="en-US" dirty="0" smtClean="0">
                 <a:latin typeface="Calibri" panose="020F0502020204030204" pitchFamily="34" charset="0"/>
               </a:rPr>
-              <a:t> To predict pickup location with more profitable </a:t>
-            </a:r>
-            <a:r>
-              <a:rPr lang="en-US" dirty="0" smtClean="0">
-                <a:latin typeface="Calibri" panose="020F0502020204030204" pitchFamily="34" charset="0"/>
-              </a:rPr>
-              <a:t>rides</a:t>
+              <a:t> To predict pickup location with more profitable rides</a:t>
             </a:r>
           </a:p>
           <a:p>
@@ -18752,9 +18795,6 @@
               </a:rPr>
               <a:t>Test Cases and Predictions: 70%</a:t>
             </a:r>
-            <a:endParaRPr lang="en-US" sz="3200" b="1" dirty="0" smtClean="0">
-              <a:latin typeface="Calibri" panose="020F0502020204030204" pitchFamily="34" charset="0"/>
-            </a:endParaRPr>
           </a:p>
           <a:p>
             <a:pPr marL="0" indent="0">
@@ -18801,7 +18841,7 @@
   <p:timing>
     <p:tnLst>
       <p:par>
-        <p:cTn id="1" dur="indefinite" restart="never" nodeType="tmRoot">
+        <p:cTn xmlns:p14="http://schemas.microsoft.com/office/powerpoint/2010/main" id="1" dur="indefinite" restart="never" nodeType="tmRoot">
           <p:childTnLst>
             <p:seq concurrent="1" nextAc="seek">
               <p:cTn id="2" dur="indefinite" nodeType="mainSeq">
@@ -19687,74 +19727,70 @@
         </p:nvSpPr>
         <p:spPr/>
         <p:txBody>
-          <a:bodyPr>
-            <a:normAutofit/>
-          </a:bodyPr>
+          <a:bodyPr/>
           <a:lstStyle/>
           <a:p>
-            <a:pPr algn="ctr"/>
-            <a:r>
-              <a:rPr lang="en-US" b="1" dirty="0" smtClean="0">
-                <a:latin typeface="Calibri" panose="020F0502020204030204" pitchFamily="34" charset="0"/>
-              </a:rPr>
-              <a:t>Thank you </a:t>
-            </a:r>
-            <a:r>
-              <a:rPr lang="en-US" b="1" dirty="0" smtClean="0">
-                <a:latin typeface="Calibri" panose="020F0502020204030204" pitchFamily="34" charset="0"/>
-                <a:sym typeface="Wingdings" panose="05000000000000000000" pitchFamily="2" charset="2"/>
-              </a:rPr>
-              <a:t> </a:t>
-            </a:r>
-            <a:endParaRPr lang="en-US" b="1" dirty="0">
-              <a:latin typeface="Calibri" panose="020F0502020204030204" pitchFamily="34" charset="0"/>
-            </a:endParaRPr>
+            <a:r>
+              <a:rPr lang="en-US" dirty="0" smtClean="0"/>
+              <a:t>Use cases</a:t>
+            </a:r>
+            <a:br>
+              <a:rPr lang="en-US" dirty="0" smtClean="0"/>
+            </a:br>
+            <a:endParaRPr lang="en-US" dirty="0"/>
           </a:p>
         </p:txBody>
       </p:sp>
-      <p:pic>
-        <p:nvPicPr>
-          <p:cNvPr id="4" name="Content Placeholder 3"/>
-          <p:cNvPicPr>
-            <a:picLocks noGrp="1" noChangeAspect="1"/>
-          </p:cNvPicPr>
+      <p:sp>
+        <p:nvSpPr>
+          <p:cNvPr id="3" name="Content Placeholder 2"/>
+          <p:cNvSpPr>
+            <a:spLocks noGrp="1"/>
+          </p:cNvSpPr>
           <p:nvPr>
             <p:ph idx="1"/>
           </p:nvPr>
-        </p:nvPicPr>
-        <p:blipFill>
-          <a:blip r:embed="rId2"/>
-          <a:stretch>
-            <a:fillRect/>
-          </a:stretch>
-        </p:blipFill>
-        <p:spPr>
-          <a:xfrm>
-            <a:off x="4459829" y="2197236"/>
-            <a:ext cx="3269166" cy="3541712"/>
-          </a:xfrm>
-          <a:prstGeom prst="rect">
-            <a:avLst/>
-          </a:prstGeom>
-        </p:spPr>
-      </p:pic>
+        </p:nvSpPr>
+        <p:spPr/>
+        <p:txBody>
+          <a:bodyPr/>
+          <a:lstStyle/>
+          <a:p>
+            <a:r>
+              <a:rPr lang="en-US" dirty="0" smtClean="0"/>
+              <a:t>Driver will get calculated brownie point from our model which will help to decide how much is probability that ride will be profitable.</a:t>
+            </a:r>
+          </a:p>
+          <a:p>
+            <a:r>
+              <a:rPr lang="en-US" dirty="0" smtClean="0"/>
+              <a:t>Driver can know the top 3 drop off locations outside Manhattan so next day ride can start from that place.</a:t>
+            </a:r>
+          </a:p>
+          <a:p>
+            <a:r>
+              <a:rPr lang="en-US" dirty="0" smtClean="0"/>
+              <a:t>Minimum wait time for passengers (brownie point calculation considers no of drivers/ passenger count in borough)</a:t>
+            </a:r>
+          </a:p>
+          <a:p>
+            <a:endParaRPr lang="en-US" dirty="0" smtClean="0"/>
+          </a:p>
+          <a:p>
+            <a:endParaRPr lang="en-US" dirty="0"/>
+          </a:p>
+        </p:txBody>
+      </p:sp>
     </p:spTree>
     <p:extLst>
       <p:ext uri="{BB962C8B-B14F-4D97-AF65-F5344CB8AC3E}">
-        <p14:creationId xmlns:p14="http://schemas.microsoft.com/office/powerpoint/2010/main" val="2289731778"/>
+        <p14:creationId xmlns:p14="http://schemas.microsoft.com/office/powerpoint/2010/main" val="535165716"/>
       </p:ext>
     </p:extLst>
   </p:cSld>
   <p:clrMapOvr>
     <a:masterClrMapping/>
   </p:clrMapOvr>
-  <p:timing>
-    <p:tnLst>
-      <p:par>
-        <p:cTn id="1" dur="indefinite" restart="never" nodeType="tmRoot"/>
-      </p:par>
-    </p:tnLst>
-  </p:timing>
 </p:sld>
 </file>
 
@@ -19801,7 +19837,7 @@
     </a:clrScheme>
     <a:fontScheme name="Circuit">
       <a:majorFont>
-        <a:latin typeface="Tw Cen MT" panose="020B0602020104020603"/>
+        <a:latin typeface="Tw Cen MT"/>
         <a:ea typeface=""/>
         <a:cs typeface=""/>
         <a:font script="Jpan" typeface="ＭＳ Ｐゴシック"/>
@@ -19836,7 +19872,7 @@
         <a:font script="Geor" typeface="Sylfaen"/>
       </a:majorFont>
       <a:minorFont>
-        <a:latin typeface="Tw Cen MT" panose="020B0602020104020603"/>
+        <a:latin typeface="Tw Cen MT"/>
         <a:ea typeface=""/>
         <a:cs typeface=""/>
         <a:font script="Jpan" typeface="ＭＳ Ｐゴシック"/>
@@ -20003,7 +20039,7 @@
   <a:extraClrSchemeLst/>
   <a:extLst>
     <a:ext uri="{05A4C25C-085E-4340-85A3-A5531E510DB2}">
-      <thm15:themeFamily xmlns:thm15="http://schemas.microsoft.com/office/thememl/2012/main" name="Circuit" id="{0AC2F7E7-15F5-431C-B2A2-456FE929F56C}" vid="{0911B802-464C-4241-8DD9-B60FF88E379F}"/>
+      <thm15:themeFamily xmlns:thm15="http://schemas.microsoft.com/office/thememl/2012/main" xmlns="" name="Circuit" id="{0AC2F7E7-15F5-431C-B2A2-456FE929F56C}" vid="{0911B802-464C-4241-8DD9-B60FF88E379F}"/>
     </a:ext>
   </a:extLst>
 </a:theme>

</xml_diff>